<commit_message>
update exploring lab ppt after review
</commit_message>
<xml_diff>
--- a/labs/ExploringOpenShift4.2ILabntro.pptx
+++ b/labs/ExploringOpenShift4.2ILabntro.pptx
@@ -253,7 +253,7 @@
           <a:p>
             <a:fld id="{24AFF12F-BC5F-3B4B-9327-6DCF0DD51A68}" type="datetimeFigureOut">
               <a:rPr lang="en-US" smtClean="0"/>
-              <a:t>2/13/20</a:t>
+              <a:t>2/14/20</a:t>
             </a:fld>
             <a:endParaRPr lang="en-US"/>
           </a:p>
@@ -4851,7 +4851,7 @@
           </a:ln>
           <a:extLst>
             <a:ext uri="{C572A759-6A51-4108-AA02-DFA0A04FC94B}">
-              <ma14:wrappingTextBoxFlag xmlns:ma14="http://schemas.microsoft.com/office/mac/drawingml/2011/main" xmlns:a14="http://schemas.microsoft.com/office/drawing/2010/main" xmlns:m="http://schemas.openxmlformats.org/officeDocument/2006/math" xmlns="" val="1"/>
+              <ma14:wrappingTextBoxFlag xmlns="" xmlns:m="http://schemas.openxmlformats.org/officeDocument/2006/math" xmlns:a14="http://schemas.microsoft.com/office/drawing/2010/main" xmlns:ma14="http://schemas.microsoft.com/office/mac/drawingml/2011/main" val="1"/>
             </a:ext>
           </a:extLst>
         </p:spPr>
@@ -8363,7 +8363,7 @@
           </a:ln>
           <a:extLst>
             <a:ext uri="{C572A759-6A51-4108-AA02-DFA0A04FC94B}">
-              <ma14:wrappingTextBoxFlag xmlns:ma14="http://schemas.microsoft.com/office/mac/drawingml/2011/main" xmlns:a14="http://schemas.microsoft.com/office/drawing/2010/main" xmlns:m="http://schemas.openxmlformats.org/officeDocument/2006/math" xmlns="" val="1"/>
+              <ma14:wrappingTextBoxFlag xmlns="" xmlns:m="http://schemas.openxmlformats.org/officeDocument/2006/math" xmlns:a14="http://schemas.microsoft.com/office/drawing/2010/main" xmlns:ma14="http://schemas.microsoft.com/office/mac/drawingml/2011/main" val="1"/>
             </a:ext>
           </a:extLst>
         </p:spPr>
@@ -8445,7 +8445,7 @@
           </a:ln>
           <a:extLst>
             <a:ext uri="{C572A759-6A51-4108-AA02-DFA0A04FC94B}">
-              <ma14:wrappingTextBoxFlag xmlns:ma14="http://schemas.microsoft.com/office/mac/drawingml/2011/main" xmlns:a14="http://schemas.microsoft.com/office/drawing/2010/main" xmlns:m="http://schemas.openxmlformats.org/officeDocument/2006/math" xmlns="" val="1"/>
+              <ma14:wrappingTextBoxFlag xmlns="" xmlns:m="http://schemas.openxmlformats.org/officeDocument/2006/math" xmlns:a14="http://schemas.microsoft.com/office/drawing/2010/main" xmlns:ma14="http://schemas.microsoft.com/office/mac/drawingml/2011/main" val="1"/>
             </a:ext>
           </a:extLst>
         </p:spPr>
@@ -18052,7 +18052,7 @@
 </file>
 
 <file path=ppt/slides/slide15.xml><?xml version="1.0" encoding="utf-8"?>
-<p:sld xmlns:a="http://schemas.openxmlformats.org/drawingml/2006/main" xmlns:r="http://schemas.openxmlformats.org/officeDocument/2006/relationships" xmlns:p="http://schemas.openxmlformats.org/presentationml/2006/main">
+<p:sld xmlns:a="http://schemas.openxmlformats.org/drawingml/2006/main" xmlns:r="http://schemas.openxmlformats.org/officeDocument/2006/relationships" xmlns:p="http://schemas.openxmlformats.org/presentationml/2006/main" show="0">
   <p:cSld>
     <p:spTree>
       <p:nvGrpSpPr>
@@ -18702,7 +18702,7 @@
 </file>
 
 <file path=ppt/slides/slide16.xml><?xml version="1.0" encoding="utf-8"?>
-<p:sld xmlns:a="http://schemas.openxmlformats.org/drawingml/2006/main" xmlns:r="http://schemas.openxmlformats.org/officeDocument/2006/relationships" xmlns:p="http://schemas.openxmlformats.org/presentationml/2006/main">
+<p:sld xmlns:a="http://schemas.openxmlformats.org/drawingml/2006/main" xmlns:r="http://schemas.openxmlformats.org/officeDocument/2006/relationships" xmlns:p="http://schemas.openxmlformats.org/presentationml/2006/main" show="0">
   <p:cSld>
     <p:spTree>
       <p:nvGrpSpPr>
@@ -19384,7 +19384,7 @@
 </file>
 
 <file path=ppt/slides/slide17.xml><?xml version="1.0" encoding="utf-8"?>
-<p:sld xmlns:a="http://schemas.openxmlformats.org/drawingml/2006/main" xmlns:r="http://schemas.openxmlformats.org/officeDocument/2006/relationships" xmlns:p="http://schemas.openxmlformats.org/presentationml/2006/main">
+<p:sld xmlns:a="http://schemas.openxmlformats.org/drawingml/2006/main" xmlns:r="http://schemas.openxmlformats.org/officeDocument/2006/relationships" xmlns:p="http://schemas.openxmlformats.org/presentationml/2006/main" show="0">
   <p:cSld>
     <p:spTree>
       <p:nvGrpSpPr>
@@ -20043,7 +20043,7 @@
 </file>
 
 <file path=ppt/slides/slide18.xml><?xml version="1.0" encoding="utf-8"?>
-<p:sld xmlns:a="http://schemas.openxmlformats.org/drawingml/2006/main" xmlns:r="http://schemas.openxmlformats.org/officeDocument/2006/relationships" xmlns:p="http://schemas.openxmlformats.org/presentationml/2006/main">
+<p:sld xmlns:a="http://schemas.openxmlformats.org/drawingml/2006/main" xmlns:r="http://schemas.openxmlformats.org/officeDocument/2006/relationships" xmlns:p="http://schemas.openxmlformats.org/presentationml/2006/main" show="0">
   <p:cSld>
     <p:spTree>
       <p:nvGrpSpPr>
@@ -21922,7 +21922,7 @@
                 <a:effectLst/>
                 <a:latin typeface="Arial" panose="020B0604020202020204" pitchFamily="34" charset="0"/>
               </a:rPr>
-              <a:t>HTTPS: 6443</a:t>
+              <a:t>HTTPS: 443</a:t>
             </a:r>
           </a:p>
         </p:txBody>
@@ -23282,7 +23282,7 @@
                 <a:effectLst/>
                 <a:latin typeface="Arial" panose="020B0604020202020204" pitchFamily="34" charset="0"/>
               </a:rPr>
-              <a:t>HTTPS: 6443</a:t>
+              <a:t>HTTPS: 443</a:t>
             </a:r>
           </a:p>
         </p:txBody>
@@ -24857,7 +24857,7 @@
                 <a:effectLst/>
                 <a:latin typeface="Arial" panose="020B0604020202020204" pitchFamily="34" charset="0"/>
               </a:rPr>
-              <a:t>HTTPS: 6443</a:t>
+              <a:t>HTTPS: 443</a:t>
             </a:r>
           </a:p>
         </p:txBody>
@@ -26243,7 +26243,7 @@
                 <a:effectLst/>
                 <a:latin typeface="Arial" panose="020B0604020202020204" pitchFamily="34" charset="0"/>
               </a:rPr>
-              <a:t>HTTPS: 6443</a:t>
+              <a:t>HTTPS: 443</a:t>
             </a:r>
           </a:p>
         </p:txBody>
@@ -27875,7 +27875,7 @@
                 <a:effectLst/>
                 <a:latin typeface="Arial" panose="020B0604020202020204" pitchFamily="34" charset="0"/>
               </a:rPr>
-              <a:t>HTTPS: 6443</a:t>
+              <a:t>HTTPS: 443</a:t>
             </a:r>
           </a:p>
         </p:txBody>

</xml_diff>